<commit_message>
Now commands can be used in console
</commit_message>
<xml_diff>
--- a/resources/MiniGameWorld.pptx
+++ b/resources/MiniGameWorld.pptx
@@ -21,8 +21,10 @@
     <p:sldId id="270" r:id="rId15"/>
     <p:sldId id="271" r:id="rId16"/>
     <p:sldId id="263" r:id="rId17"/>
-    <p:sldId id="272" r:id="rId18"/>
-    <p:sldId id="273" r:id="rId19"/>
+    <p:sldId id="274" r:id="rId18"/>
+    <p:sldId id="277" r:id="rId19"/>
+    <p:sldId id="272" r:id="rId20"/>
+    <p:sldId id="273" r:id="rId21"/>
   </p:sldIdLst>
   <p:sldSz cx="24384000" cy="13716000"/>
   <p:notesSz cx="6858000" cy="9144000"/>
@@ -260,7 +262,7 @@
           <a:p>
             <a:fld id="{68DD77C6-9199-49BA-BC71-D4B35AFBC7B4}" type="datetimeFigureOut">
               <a:rPr lang="ko-KR" altLang="en-US" smtClean="0"/>
-              <a:t>2021-10-28</a:t>
+              <a:t>2021-12-13</a:t>
             </a:fld>
             <a:endParaRPr lang="ko-KR" altLang="en-US"/>
           </a:p>
@@ -430,7 +432,7 @@
           <a:p>
             <a:fld id="{68DD77C6-9199-49BA-BC71-D4B35AFBC7B4}" type="datetimeFigureOut">
               <a:rPr lang="ko-KR" altLang="en-US" smtClean="0"/>
-              <a:t>2021-10-28</a:t>
+              <a:t>2021-12-13</a:t>
             </a:fld>
             <a:endParaRPr lang="ko-KR" altLang="en-US"/>
           </a:p>
@@ -610,7 +612,7 @@
           <a:p>
             <a:fld id="{68DD77C6-9199-49BA-BC71-D4B35AFBC7B4}" type="datetimeFigureOut">
               <a:rPr lang="ko-KR" altLang="en-US" smtClean="0"/>
-              <a:t>2021-10-28</a:t>
+              <a:t>2021-12-13</a:t>
             </a:fld>
             <a:endParaRPr lang="ko-KR" altLang="en-US"/>
           </a:p>
@@ -780,7 +782,7 @@
           <a:p>
             <a:fld id="{68DD77C6-9199-49BA-BC71-D4B35AFBC7B4}" type="datetimeFigureOut">
               <a:rPr lang="ko-KR" altLang="en-US" smtClean="0"/>
-              <a:t>2021-10-28</a:t>
+              <a:t>2021-12-13</a:t>
             </a:fld>
             <a:endParaRPr lang="ko-KR" altLang="en-US"/>
           </a:p>
@@ -1026,7 +1028,7 @@
           <a:p>
             <a:fld id="{68DD77C6-9199-49BA-BC71-D4B35AFBC7B4}" type="datetimeFigureOut">
               <a:rPr lang="ko-KR" altLang="en-US" smtClean="0"/>
-              <a:t>2021-10-28</a:t>
+              <a:t>2021-12-13</a:t>
             </a:fld>
             <a:endParaRPr lang="ko-KR" altLang="en-US"/>
           </a:p>
@@ -1258,7 +1260,7 @@
           <a:p>
             <a:fld id="{68DD77C6-9199-49BA-BC71-D4B35AFBC7B4}" type="datetimeFigureOut">
               <a:rPr lang="ko-KR" altLang="en-US" smtClean="0"/>
-              <a:t>2021-10-28</a:t>
+              <a:t>2021-12-13</a:t>
             </a:fld>
             <a:endParaRPr lang="ko-KR" altLang="en-US"/>
           </a:p>
@@ -1625,7 +1627,7 @@
           <a:p>
             <a:fld id="{68DD77C6-9199-49BA-BC71-D4B35AFBC7B4}" type="datetimeFigureOut">
               <a:rPr lang="ko-KR" altLang="en-US" smtClean="0"/>
-              <a:t>2021-10-28</a:t>
+              <a:t>2021-12-13</a:t>
             </a:fld>
             <a:endParaRPr lang="ko-KR" altLang="en-US"/>
           </a:p>
@@ -1743,7 +1745,7 @@
           <a:p>
             <a:fld id="{68DD77C6-9199-49BA-BC71-D4B35AFBC7B4}" type="datetimeFigureOut">
               <a:rPr lang="ko-KR" altLang="en-US" smtClean="0"/>
-              <a:t>2021-10-28</a:t>
+              <a:t>2021-12-13</a:t>
             </a:fld>
             <a:endParaRPr lang="ko-KR" altLang="en-US"/>
           </a:p>
@@ -1838,7 +1840,7 @@
           <a:p>
             <a:fld id="{68DD77C6-9199-49BA-BC71-D4B35AFBC7B4}" type="datetimeFigureOut">
               <a:rPr lang="ko-KR" altLang="en-US" smtClean="0"/>
-              <a:t>2021-10-28</a:t>
+              <a:t>2021-12-13</a:t>
             </a:fld>
             <a:endParaRPr lang="ko-KR" altLang="en-US"/>
           </a:p>
@@ -2115,7 +2117,7 @@
           <a:p>
             <a:fld id="{68DD77C6-9199-49BA-BC71-D4B35AFBC7B4}" type="datetimeFigureOut">
               <a:rPr lang="ko-KR" altLang="en-US" smtClean="0"/>
-              <a:t>2021-10-28</a:t>
+              <a:t>2021-12-13</a:t>
             </a:fld>
             <a:endParaRPr lang="ko-KR" altLang="en-US"/>
           </a:p>
@@ -2372,7 +2374,7 @@
           <a:p>
             <a:fld id="{68DD77C6-9199-49BA-BC71-D4B35AFBC7B4}" type="datetimeFigureOut">
               <a:rPr lang="ko-KR" altLang="en-US" smtClean="0"/>
-              <a:t>2021-10-28</a:t>
+              <a:t>2021-12-13</a:t>
             </a:fld>
             <a:endParaRPr lang="ko-KR" altLang="en-US"/>
           </a:p>
@@ -2585,7 +2587,7 @@
           <a:p>
             <a:fld id="{68DD77C6-9199-49BA-BC71-D4B35AFBC7B4}" type="datetimeFigureOut">
               <a:rPr lang="ko-KR" altLang="en-US" smtClean="0"/>
-              <a:t>2021-10-28</a:t>
+              <a:t>2021-12-13</a:t>
             </a:fld>
             <a:endParaRPr lang="ko-KR" altLang="en-US"/>
           </a:p>
@@ -4537,10 +4539,10 @@
       </p:grpSpPr>
       <p:pic>
         <p:nvPicPr>
-          <p:cNvPr id="5" name="Picture 4">
-            <a:extLst>
-              <a:ext uri="{FF2B5EF4-FFF2-40B4-BE49-F238E27FC236}">
-                <a16:creationId xmlns:a16="http://schemas.microsoft.com/office/drawing/2014/main" id="{84FB8C8C-1130-4848-AFA6-97CECB8B6E99}"/>
+          <p:cNvPr id="6" name="Picture 5">
+            <a:extLst>
+              <a:ext uri="{FF2B5EF4-FFF2-40B4-BE49-F238E27FC236}">
+                <a16:creationId xmlns:a16="http://schemas.microsoft.com/office/drawing/2014/main" id="{5AE1C0AE-9FF3-4FC5-9301-35718FFFB10A}"/>
               </a:ext>
             </a:extLst>
           </p:cNvPr>
@@ -4563,8 +4565,8 @@
         </p:blipFill>
         <p:spPr>
           <a:xfrm>
-            <a:off x="1278590" y="1197908"/>
-            <a:ext cx="4656045" cy="4656045"/>
+            <a:off x="-966651" y="0"/>
+            <a:ext cx="13689874" cy="13689874"/>
           </a:xfrm>
           <a:prstGeom prst="rect">
             <a:avLst/>
@@ -4573,10 +4575,10 @@
       </p:pic>
       <p:sp>
         <p:nvSpPr>
-          <p:cNvPr id="6" name="TextBox 5">
-            <a:extLst>
-              <a:ext uri="{FF2B5EF4-FFF2-40B4-BE49-F238E27FC236}">
-                <a16:creationId xmlns:a16="http://schemas.microsoft.com/office/drawing/2014/main" id="{910F1005-3FF1-4AE0-9D27-7C42963A5251}"/>
+          <p:cNvPr id="4" name="TextBox 3">
+            <a:extLst>
+              <a:ext uri="{FF2B5EF4-FFF2-40B4-BE49-F238E27FC236}">
+                <a16:creationId xmlns:a16="http://schemas.microsoft.com/office/drawing/2014/main" id="{49B7A5D7-DD4B-47CE-B121-96FDF0201ACE}"/>
               </a:ext>
             </a:extLst>
           </p:cNvPr>
@@ -4585,8 +4587,8 @@
         </p:nvSpPr>
         <p:spPr>
           <a:xfrm>
-            <a:off x="6736976" y="1948575"/>
-            <a:ext cx="17750118" cy="3154710"/>
+            <a:off x="10086583" y="5346238"/>
+            <a:ext cx="14297415" cy="5847755"/>
           </a:xfrm>
           <a:prstGeom prst="rect">
             <a:avLst/>
@@ -4599,59 +4601,61 @@
           </a:bodyPr>
           <a:lstStyle/>
           <a:p>
-            <a:r>
-              <a:rPr lang="en-US" altLang="ko-KR" sz="19900" b="1" dirty="0">
+            <a:pPr algn="ctr">
+              <a:spcBef>
+                <a:spcPts val="10"/>
+              </a:spcBef>
+              <a:spcAft>
+                <a:spcPts val="10"/>
+              </a:spcAft>
+            </a:pPr>
+            <a:endParaRPr lang="en-US" altLang="ko-KR" sz="5400" b="1" dirty="0">
+              <a:solidFill>
+                <a:schemeClr val="bg1"/>
+              </a:solidFill>
+            </a:endParaRPr>
+          </a:p>
+          <a:p>
+            <a:pPr algn="ctr">
+              <a:spcBef>
+                <a:spcPts val="10"/>
+              </a:spcBef>
+              <a:spcAft>
+                <a:spcPts val="10"/>
+              </a:spcAft>
+            </a:pPr>
+            <a:r>
+              <a:rPr lang="en-US" altLang="ko-KR" sz="16000" b="1" dirty="0" err="1">
                 <a:solidFill>
                   <a:schemeClr val="bg1"/>
                 </a:solidFill>
               </a:rPr>
-              <a:t>Discord</a:t>
-            </a:r>
-            <a:endParaRPr lang="ko-KR" altLang="en-US" sz="19900" b="1" dirty="0">
+              <a:t>MiniGameWorld</a:t>
+            </a:r>
+            <a:endParaRPr lang="en-US" altLang="ko-KR" sz="16000" b="1" dirty="0">
               <a:solidFill>
                 <a:schemeClr val="bg1"/>
               </a:solidFill>
             </a:endParaRPr>
           </a:p>
-        </p:txBody>
-      </p:sp>
-      <p:sp>
-        <p:nvSpPr>
-          <p:cNvPr id="17" name="TextBox 16">
-            <a:extLst>
-              <a:ext uri="{FF2B5EF4-FFF2-40B4-BE49-F238E27FC236}">
-                <a16:creationId xmlns:a16="http://schemas.microsoft.com/office/drawing/2014/main" id="{3D933A76-BB65-470E-B9CB-DCC27B30ED66}"/>
-              </a:ext>
-            </a:extLst>
-          </p:cNvPr>
-          <p:cNvSpPr txBox="1"/>
-          <p:nvPr/>
-        </p:nvSpPr>
-        <p:spPr>
-          <a:xfrm>
-            <a:off x="6705600" y="8660773"/>
-            <a:ext cx="17750118" cy="3154710"/>
-          </a:xfrm>
-          <a:prstGeom prst="rect">
-            <a:avLst/>
-          </a:prstGeom>
-          <a:noFill/>
-        </p:spPr>
-        <p:txBody>
-          <a:bodyPr wrap="square" rtlCol="0">
-            <a:spAutoFit/>
-          </a:bodyPr>
-          <a:lstStyle/>
-          <a:p>
-            <a:r>
-              <a:rPr lang="en-US" altLang="ko-KR" sz="19900" b="1" dirty="0">
+          <a:p>
+            <a:pPr algn="ctr">
+              <a:spcBef>
+                <a:spcPts val="10"/>
+              </a:spcBef>
+              <a:spcAft>
+                <a:spcPts val="10"/>
+              </a:spcAft>
+            </a:pPr>
+            <a:r>
+              <a:rPr lang="en-US" altLang="ko-KR" sz="16000" b="1" dirty="0">
                 <a:solidFill>
                   <a:schemeClr val="bg1"/>
                 </a:solidFill>
               </a:rPr>
-              <a:t>Community</a:t>
-            </a:r>
-            <a:endParaRPr lang="ko-KR" altLang="en-US" sz="19900" b="1" dirty="0">
+              <a:t>- Reward</a:t>
+            </a:r>
+            <a:endParaRPr lang="ko-KR" altLang="en-US" sz="16000" b="1" dirty="0">
               <a:solidFill>
                 <a:schemeClr val="bg1"/>
               </a:solidFill>
@@ -4659,81 +4663,52 @@
           </a:p>
         </p:txBody>
       </p:sp>
-      <p:pic>
-        <p:nvPicPr>
-          <p:cNvPr id="21" name="Picture 20">
-            <a:extLst>
-              <a:ext uri="{FF2B5EF4-FFF2-40B4-BE49-F238E27FC236}">
-                <a16:creationId xmlns:a16="http://schemas.microsoft.com/office/drawing/2014/main" id="{A058BEA2-FB50-443F-8DEC-70B71538481B}"/>
-              </a:ext>
-            </a:extLst>
-          </p:cNvPr>
-          <p:cNvPicPr>
-            <a:picLocks noChangeAspect="1"/>
-          </p:cNvPicPr>
-          <p:nvPr/>
-        </p:nvPicPr>
-        <p:blipFill>
-          <a:blip r:embed="rId3">
-            <a:extLst>
-              <a:ext uri="{28A0092B-C50C-407E-A947-70E740481C1C}">
-                <a14:useLocalDpi xmlns:a14="http://schemas.microsoft.com/office/drawing/2010/main" val="0"/>
-              </a:ext>
-            </a:extLst>
-          </a:blip>
-          <a:stretch>
-            <a:fillRect/>
-          </a:stretch>
-        </p:blipFill>
-        <p:spPr>
-          <a:xfrm>
-            <a:off x="1441073" y="7862048"/>
-            <a:ext cx="4331078" cy="4331078"/>
+      <p:sp>
+        <p:nvSpPr>
+          <p:cNvPr id="2" name="TextBox 1">
+            <a:extLst>
+              <a:ext uri="{FF2B5EF4-FFF2-40B4-BE49-F238E27FC236}">
+                <a16:creationId xmlns:a16="http://schemas.microsoft.com/office/drawing/2014/main" id="{94D460DE-9E66-4756-8446-F6AD5689E38C}"/>
+              </a:ext>
+            </a:extLst>
+          </p:cNvPr>
+          <p:cNvSpPr txBox="1"/>
+          <p:nvPr/>
+        </p:nvSpPr>
+        <p:spPr>
+          <a:xfrm>
+            <a:off x="10086584" y="1021977"/>
+            <a:ext cx="14297415" cy="4324261"/>
           </a:xfrm>
           <a:prstGeom prst="rect">
             <a:avLst/>
           </a:prstGeom>
-        </p:spPr>
-      </p:pic>
-      <p:sp>
-        <p:nvSpPr>
-          <p:cNvPr id="23" name="TextBox 22">
-            <a:extLst>
-              <a:ext uri="{FF2B5EF4-FFF2-40B4-BE49-F238E27FC236}">
-                <a16:creationId xmlns:a16="http://schemas.microsoft.com/office/drawing/2014/main" id="{89927D47-E120-49F3-9969-0AD38E243669}"/>
-              </a:ext>
-            </a:extLst>
-          </p:cNvPr>
-          <p:cNvSpPr txBox="1"/>
-          <p:nvPr/>
-        </p:nvSpPr>
-        <p:spPr>
-          <a:xfrm>
-            <a:off x="6324600" y="6673334"/>
-            <a:ext cx="12649200" cy="369332"/>
-          </a:xfrm>
-          <a:prstGeom prst="rect">
-            <a:avLst/>
-          </a:prstGeom>
           <a:noFill/>
         </p:spPr>
         <p:txBody>
-          <a:bodyPr wrap="square">
+          <a:bodyPr wrap="square" rtlCol="0">
             <a:spAutoFit/>
           </a:bodyPr>
           <a:lstStyle/>
           <a:p>
             <a:r>
-              <a:rPr lang="ko-KR" altLang="en-US" dirty="0"/>
-              <a:t>교환학생</a:t>
-            </a:r>
+              <a:rPr lang="en-US" altLang="ko-KR" sz="23900" b="1" dirty="0">
+                <a:solidFill>
+                  <a:schemeClr val="bg1"/>
+                </a:solidFill>
+              </a:rPr>
+              <a:t>Third-Party</a:t>
+            </a:r>
+          </a:p>
+          <a:p>
+            <a:endParaRPr lang="ko-KR" altLang="en-US" sz="3600" dirty="0"/>
           </a:p>
         </p:txBody>
       </p:sp>
     </p:spTree>
     <p:extLst>
       <p:ext uri="{BB962C8B-B14F-4D97-AF65-F5344CB8AC3E}">
-        <p14:creationId xmlns:p14="http://schemas.microsoft.com/office/powerpoint/2010/main" val="463350991"/>
+        <p14:creationId xmlns:p14="http://schemas.microsoft.com/office/powerpoint/2010/main" val="1826229196"/>
       </p:ext>
     </p:extLst>
   </p:cSld>
@@ -4768,6 +4743,248 @@
           <a:chExt cx="0" cy="0"/>
         </a:xfrm>
       </p:grpSpPr>
+      <p:pic>
+        <p:nvPicPr>
+          <p:cNvPr id="6" name="Picture 5">
+            <a:extLst>
+              <a:ext uri="{FF2B5EF4-FFF2-40B4-BE49-F238E27FC236}">
+                <a16:creationId xmlns:a16="http://schemas.microsoft.com/office/drawing/2014/main" id="{5AE1C0AE-9FF3-4FC5-9301-35718FFFB10A}"/>
+              </a:ext>
+            </a:extLst>
+          </p:cNvPr>
+          <p:cNvPicPr>
+            <a:picLocks noChangeAspect="1"/>
+          </p:cNvPicPr>
+          <p:nvPr/>
+        </p:nvPicPr>
+        <p:blipFill>
+          <a:blip r:embed="rId2">
+            <a:extLst>
+              <a:ext uri="{28A0092B-C50C-407E-A947-70E740481C1C}">
+                <a14:useLocalDpi xmlns:a14="http://schemas.microsoft.com/office/drawing/2010/main" val="0"/>
+              </a:ext>
+            </a:extLst>
+          </a:blip>
+          <a:stretch>
+            <a:fillRect/>
+          </a:stretch>
+        </p:blipFill>
+        <p:spPr>
+          <a:xfrm>
+            <a:off x="-966651" y="0"/>
+            <a:ext cx="13689874" cy="13689874"/>
+          </a:xfrm>
+          <a:prstGeom prst="rect">
+            <a:avLst/>
+          </a:prstGeom>
+        </p:spPr>
+      </p:pic>
+      <p:sp>
+        <p:nvSpPr>
+          <p:cNvPr id="4" name="TextBox 3">
+            <a:extLst>
+              <a:ext uri="{FF2B5EF4-FFF2-40B4-BE49-F238E27FC236}">
+                <a16:creationId xmlns:a16="http://schemas.microsoft.com/office/drawing/2014/main" id="{49B7A5D7-DD4B-47CE-B121-96FDF0201ACE}"/>
+              </a:ext>
+            </a:extLst>
+          </p:cNvPr>
+          <p:cNvSpPr txBox="1"/>
+          <p:nvPr/>
+        </p:nvSpPr>
+        <p:spPr>
+          <a:xfrm>
+            <a:off x="10086583" y="5346238"/>
+            <a:ext cx="14297415" cy="5847755"/>
+          </a:xfrm>
+          <a:prstGeom prst="rect">
+            <a:avLst/>
+          </a:prstGeom>
+          <a:noFill/>
+        </p:spPr>
+        <p:txBody>
+          <a:bodyPr wrap="square" rtlCol="0">
+            <a:spAutoFit/>
+          </a:bodyPr>
+          <a:lstStyle/>
+          <a:p>
+            <a:pPr algn="ctr">
+              <a:spcBef>
+                <a:spcPts val="10"/>
+              </a:spcBef>
+              <a:spcAft>
+                <a:spcPts val="10"/>
+              </a:spcAft>
+            </a:pPr>
+            <a:endParaRPr lang="en-US" altLang="ko-KR" sz="5400" b="1" dirty="0">
+              <a:solidFill>
+                <a:schemeClr val="bg1"/>
+              </a:solidFill>
+            </a:endParaRPr>
+          </a:p>
+          <a:p>
+            <a:pPr algn="ctr">
+              <a:spcBef>
+                <a:spcPts val="10"/>
+              </a:spcBef>
+              <a:spcAft>
+                <a:spcPts val="10"/>
+              </a:spcAft>
+            </a:pPr>
+            <a:r>
+              <a:rPr lang="en-US" altLang="ko-KR" sz="16000" b="1" dirty="0" err="1">
+                <a:solidFill>
+                  <a:schemeClr val="bg1"/>
+                </a:solidFill>
+              </a:rPr>
+              <a:t>MiniGameWorld</a:t>
+            </a:r>
+            <a:endParaRPr lang="en-US" altLang="ko-KR" sz="16000" b="1" dirty="0">
+              <a:solidFill>
+                <a:schemeClr val="bg1"/>
+              </a:solidFill>
+            </a:endParaRPr>
+          </a:p>
+          <a:p>
+            <a:pPr algn="ctr">
+              <a:spcBef>
+                <a:spcPts val="10"/>
+              </a:spcBef>
+              <a:spcAft>
+                <a:spcPts val="10"/>
+              </a:spcAft>
+            </a:pPr>
+            <a:r>
+              <a:rPr lang="en-US" altLang="ko-KR" sz="16000" b="1" dirty="0">
+                <a:solidFill>
+                  <a:schemeClr val="bg1"/>
+                </a:solidFill>
+              </a:rPr>
+              <a:t>- Rank</a:t>
+            </a:r>
+            <a:endParaRPr lang="ko-KR" altLang="en-US" sz="16000" b="1" dirty="0">
+              <a:solidFill>
+                <a:schemeClr val="bg1"/>
+              </a:solidFill>
+            </a:endParaRPr>
+          </a:p>
+        </p:txBody>
+      </p:sp>
+      <p:sp>
+        <p:nvSpPr>
+          <p:cNvPr id="2" name="TextBox 1">
+            <a:extLst>
+              <a:ext uri="{FF2B5EF4-FFF2-40B4-BE49-F238E27FC236}">
+                <a16:creationId xmlns:a16="http://schemas.microsoft.com/office/drawing/2014/main" id="{94D460DE-9E66-4756-8446-F6AD5689E38C}"/>
+              </a:ext>
+            </a:extLst>
+          </p:cNvPr>
+          <p:cNvSpPr txBox="1"/>
+          <p:nvPr/>
+        </p:nvSpPr>
+        <p:spPr>
+          <a:xfrm>
+            <a:off x="10086584" y="1021977"/>
+            <a:ext cx="14297415" cy="4324261"/>
+          </a:xfrm>
+          <a:prstGeom prst="rect">
+            <a:avLst/>
+          </a:prstGeom>
+          <a:noFill/>
+        </p:spPr>
+        <p:txBody>
+          <a:bodyPr wrap="square" rtlCol="0">
+            <a:spAutoFit/>
+          </a:bodyPr>
+          <a:lstStyle/>
+          <a:p>
+            <a:r>
+              <a:rPr lang="en-US" altLang="ko-KR" sz="23900" b="1" dirty="0">
+                <a:solidFill>
+                  <a:schemeClr val="bg1"/>
+                </a:solidFill>
+              </a:rPr>
+              <a:t>Third-Party</a:t>
+            </a:r>
+          </a:p>
+          <a:p>
+            <a:endParaRPr lang="ko-KR" altLang="en-US" sz="3600" dirty="0"/>
+          </a:p>
+        </p:txBody>
+      </p:sp>
+    </p:spTree>
+    <p:extLst>
+      <p:ext uri="{BB962C8B-B14F-4D97-AF65-F5344CB8AC3E}">
+        <p14:creationId xmlns:p14="http://schemas.microsoft.com/office/powerpoint/2010/main" val="3775055121"/>
+      </p:ext>
+    </p:extLst>
+  </p:cSld>
+  <p:clrMapOvr>
+    <a:masterClrMapping/>
+  </p:clrMapOvr>
+</p:sld>
+</file>
+
+<file path=ppt/slides/slide19.xml><?xml version="1.0" encoding="utf-8"?>
+<p:sld xmlns:a="http://schemas.openxmlformats.org/drawingml/2006/main" xmlns:r="http://schemas.openxmlformats.org/officeDocument/2006/relationships" xmlns:p="http://schemas.openxmlformats.org/presentationml/2006/main">
+  <p:cSld>
+    <p:bg>
+      <p:bgPr>
+        <a:solidFill>
+          <a:schemeClr val="tx1"/>
+        </a:solidFill>
+        <a:effectLst/>
+      </p:bgPr>
+    </p:bg>
+    <p:spTree>
+      <p:nvGrpSpPr>
+        <p:cNvPr id="1" name=""/>
+        <p:cNvGrpSpPr/>
+        <p:nvPr/>
+      </p:nvGrpSpPr>
+      <p:grpSpPr>
+        <a:xfrm>
+          <a:off x="0" y="0"/>
+          <a:ext cx="0" cy="0"/>
+          <a:chOff x="0" y="0"/>
+          <a:chExt cx="0" cy="0"/>
+        </a:xfrm>
+      </p:grpSpPr>
+      <p:pic>
+        <p:nvPicPr>
+          <p:cNvPr id="5" name="Picture 4">
+            <a:extLst>
+              <a:ext uri="{FF2B5EF4-FFF2-40B4-BE49-F238E27FC236}">
+                <a16:creationId xmlns:a16="http://schemas.microsoft.com/office/drawing/2014/main" id="{84FB8C8C-1130-4848-AFA6-97CECB8B6E99}"/>
+              </a:ext>
+            </a:extLst>
+          </p:cNvPr>
+          <p:cNvPicPr>
+            <a:picLocks noChangeAspect="1"/>
+          </p:cNvPicPr>
+          <p:nvPr/>
+        </p:nvPicPr>
+        <p:blipFill>
+          <a:blip r:embed="rId2">
+            <a:extLst>
+              <a:ext uri="{28A0092B-C50C-407E-A947-70E740481C1C}">
+                <a14:useLocalDpi xmlns:a14="http://schemas.microsoft.com/office/drawing/2010/main" val="0"/>
+              </a:ext>
+            </a:extLst>
+          </a:blip>
+          <a:stretch>
+            <a:fillRect/>
+          </a:stretch>
+        </p:blipFill>
+        <p:spPr>
+          <a:xfrm>
+            <a:off x="1278590" y="1197908"/>
+            <a:ext cx="4656045" cy="4656045"/>
+          </a:xfrm>
+          <a:prstGeom prst="rect">
+            <a:avLst/>
+          </a:prstGeom>
+        </p:spPr>
+      </p:pic>
       <p:sp>
         <p:nvSpPr>
           <p:cNvPr id="6" name="TextBox 5">
@@ -4782,7 +4999,7 @@
         </p:nvSpPr>
         <p:spPr>
           <a:xfrm>
-            <a:off x="6275294" y="1900517"/>
+            <a:off x="6736976" y="1948575"/>
             <a:ext cx="17750118" cy="3154710"/>
           </a:xfrm>
           <a:prstGeom prst="rect">
@@ -4802,7 +5019,7 @@
                   <a:schemeClr val="bg1"/>
                 </a:solidFill>
               </a:rPr>
-              <a:t>User Wiki</a:t>
+              <a:t>Discord</a:t>
             </a:r>
             <a:endParaRPr lang="ko-KR" altLang="en-US" sz="19900" b="1" dirty="0">
               <a:solidFill>
@@ -4826,7 +5043,7 @@
         </p:nvSpPr>
         <p:spPr>
           <a:xfrm>
-            <a:off x="6324600" y="8450231"/>
+            <a:off x="6705600" y="8660773"/>
             <a:ext cx="17750118" cy="3154710"/>
           </a:xfrm>
           <a:prstGeom prst="rect">
@@ -4846,7 +5063,7 @@
                   <a:schemeClr val="bg1"/>
                 </a:solidFill>
               </a:rPr>
-              <a:t>Dev Wiki</a:t>
+              <a:t>Community</a:t>
             </a:r>
             <a:endParaRPr lang="ko-KR" altLang="en-US" sz="19900" b="1" dirty="0">
               <a:solidFill>
@@ -4858,10 +5075,10 @@
       </p:sp>
       <p:pic>
         <p:nvPicPr>
-          <p:cNvPr id="12" name="Picture 11">
-            <a:extLst>
-              <a:ext uri="{FF2B5EF4-FFF2-40B4-BE49-F238E27FC236}">
-                <a16:creationId xmlns:a16="http://schemas.microsoft.com/office/drawing/2014/main" id="{3D9F4A68-1079-4FDD-AD1B-C901DB881D8A}"/>
+          <p:cNvPr id="21" name="Picture 20">
+            <a:extLst>
+              <a:ext uri="{FF2B5EF4-FFF2-40B4-BE49-F238E27FC236}">
+                <a16:creationId xmlns:a16="http://schemas.microsoft.com/office/drawing/2014/main" id="{A058BEA2-FB50-443F-8DEC-70B71538481B}"/>
               </a:ext>
             </a:extLst>
           </p:cNvPr>
@@ -4871,7 +5088,7 @@
           <p:nvPr/>
         </p:nvPicPr>
         <p:blipFill>
-          <a:blip r:embed="rId2">
+          <a:blip r:embed="rId3">
             <a:extLst>
               <a:ext uri="{28A0092B-C50C-407E-A947-70E740481C1C}">
                 <a14:useLocalDpi xmlns:a14="http://schemas.microsoft.com/office/drawing/2010/main" val="0"/>
@@ -4884,54 +5101,53 @@
         </p:blipFill>
         <p:spPr>
           <a:xfrm>
-            <a:off x="1775316" y="1738590"/>
-            <a:ext cx="3316637" cy="3316637"/>
+            <a:off x="1441073" y="7862048"/>
+            <a:ext cx="4331078" cy="4331078"/>
           </a:xfrm>
           <a:prstGeom prst="rect">
             <a:avLst/>
           </a:prstGeom>
         </p:spPr>
       </p:pic>
-      <p:pic>
-        <p:nvPicPr>
-          <p:cNvPr id="14" name="Picture 13">
-            <a:extLst>
-              <a:ext uri="{FF2B5EF4-FFF2-40B4-BE49-F238E27FC236}">
-                <a16:creationId xmlns:a16="http://schemas.microsoft.com/office/drawing/2014/main" id="{F2103119-5F42-4A8E-B991-74DC7A81966D}"/>
-              </a:ext>
-            </a:extLst>
-          </p:cNvPr>
-          <p:cNvPicPr>
-            <a:picLocks noChangeAspect="1"/>
-          </p:cNvPicPr>
-          <p:nvPr/>
-        </p:nvPicPr>
-        <p:blipFill>
-          <a:blip r:embed="rId3">
-            <a:extLst>
-              <a:ext uri="{28A0092B-C50C-407E-A947-70E740481C1C}">
-                <a14:useLocalDpi xmlns:a14="http://schemas.microsoft.com/office/drawing/2010/main" val="0"/>
-              </a:ext>
-            </a:extLst>
-          </a:blip>
-          <a:stretch>
-            <a:fillRect/>
-          </a:stretch>
-        </p:blipFill>
-        <p:spPr>
-          <a:xfrm>
-            <a:off x="1775315" y="8369267"/>
-            <a:ext cx="3316638" cy="3316638"/>
+      <p:sp>
+        <p:nvSpPr>
+          <p:cNvPr id="23" name="TextBox 22">
+            <a:extLst>
+              <a:ext uri="{FF2B5EF4-FFF2-40B4-BE49-F238E27FC236}">
+                <a16:creationId xmlns:a16="http://schemas.microsoft.com/office/drawing/2014/main" id="{89927D47-E120-49F3-9969-0AD38E243669}"/>
+              </a:ext>
+            </a:extLst>
+          </p:cNvPr>
+          <p:cNvSpPr txBox="1"/>
+          <p:nvPr/>
+        </p:nvSpPr>
+        <p:spPr>
+          <a:xfrm>
+            <a:off x="6324600" y="6673334"/>
+            <a:ext cx="12649200" cy="369332"/>
           </a:xfrm>
           <a:prstGeom prst="rect">
             <a:avLst/>
           </a:prstGeom>
-        </p:spPr>
-      </p:pic>
+          <a:noFill/>
+        </p:spPr>
+        <p:txBody>
+          <a:bodyPr wrap="square">
+            <a:spAutoFit/>
+          </a:bodyPr>
+          <a:lstStyle/>
+          <a:p>
+            <a:r>
+              <a:rPr lang="ko-KR" altLang="en-US" dirty="0"/>
+              <a:t>교환학생</a:t>
+            </a:r>
+          </a:p>
+        </p:txBody>
+      </p:sp>
     </p:spTree>
     <p:extLst>
       <p:ext uri="{BB962C8B-B14F-4D97-AF65-F5344CB8AC3E}">
-        <p14:creationId xmlns:p14="http://schemas.microsoft.com/office/powerpoint/2010/main" val="3327707984"/>
+        <p14:creationId xmlns:p14="http://schemas.microsoft.com/office/powerpoint/2010/main" val="463350991"/>
       </p:ext>
     </p:extLst>
   </p:cSld>
@@ -6950,6 +7166,204 @@
     <p:extLst>
       <p:ext uri="{BB962C8B-B14F-4D97-AF65-F5344CB8AC3E}">
         <p14:creationId xmlns:p14="http://schemas.microsoft.com/office/powerpoint/2010/main" val="2188836236"/>
+      </p:ext>
+    </p:extLst>
+  </p:cSld>
+  <p:clrMapOvr>
+    <a:masterClrMapping/>
+  </p:clrMapOvr>
+</p:sld>
+</file>
+
+<file path=ppt/slides/slide20.xml><?xml version="1.0" encoding="utf-8"?>
+<p:sld xmlns:a="http://schemas.openxmlformats.org/drawingml/2006/main" xmlns:r="http://schemas.openxmlformats.org/officeDocument/2006/relationships" xmlns:p="http://schemas.openxmlformats.org/presentationml/2006/main">
+  <p:cSld>
+    <p:bg>
+      <p:bgPr>
+        <a:solidFill>
+          <a:schemeClr val="tx1"/>
+        </a:solidFill>
+        <a:effectLst/>
+      </p:bgPr>
+    </p:bg>
+    <p:spTree>
+      <p:nvGrpSpPr>
+        <p:cNvPr id="1" name=""/>
+        <p:cNvGrpSpPr/>
+        <p:nvPr/>
+      </p:nvGrpSpPr>
+      <p:grpSpPr>
+        <a:xfrm>
+          <a:off x="0" y="0"/>
+          <a:ext cx="0" cy="0"/>
+          <a:chOff x="0" y="0"/>
+          <a:chExt cx="0" cy="0"/>
+        </a:xfrm>
+      </p:grpSpPr>
+      <p:sp>
+        <p:nvSpPr>
+          <p:cNvPr id="6" name="TextBox 5">
+            <a:extLst>
+              <a:ext uri="{FF2B5EF4-FFF2-40B4-BE49-F238E27FC236}">
+                <a16:creationId xmlns:a16="http://schemas.microsoft.com/office/drawing/2014/main" id="{910F1005-3FF1-4AE0-9D27-7C42963A5251}"/>
+              </a:ext>
+            </a:extLst>
+          </p:cNvPr>
+          <p:cNvSpPr txBox="1"/>
+          <p:nvPr/>
+        </p:nvSpPr>
+        <p:spPr>
+          <a:xfrm>
+            <a:off x="6275294" y="1900517"/>
+            <a:ext cx="17750118" cy="3154710"/>
+          </a:xfrm>
+          <a:prstGeom prst="rect">
+            <a:avLst/>
+          </a:prstGeom>
+          <a:noFill/>
+        </p:spPr>
+        <p:txBody>
+          <a:bodyPr wrap="square" rtlCol="0">
+            <a:spAutoFit/>
+          </a:bodyPr>
+          <a:lstStyle/>
+          <a:p>
+            <a:r>
+              <a:rPr lang="en-US" altLang="ko-KR" sz="19900" b="1" dirty="0">
+                <a:solidFill>
+                  <a:schemeClr val="bg1"/>
+                </a:solidFill>
+              </a:rPr>
+              <a:t>User Wiki</a:t>
+            </a:r>
+            <a:endParaRPr lang="ko-KR" altLang="en-US" sz="19900" b="1" dirty="0">
+              <a:solidFill>
+                <a:schemeClr val="bg1"/>
+              </a:solidFill>
+            </a:endParaRPr>
+          </a:p>
+        </p:txBody>
+      </p:sp>
+      <p:sp>
+        <p:nvSpPr>
+          <p:cNvPr id="17" name="TextBox 16">
+            <a:extLst>
+              <a:ext uri="{FF2B5EF4-FFF2-40B4-BE49-F238E27FC236}">
+                <a16:creationId xmlns:a16="http://schemas.microsoft.com/office/drawing/2014/main" id="{3D933A76-BB65-470E-B9CB-DCC27B30ED66}"/>
+              </a:ext>
+            </a:extLst>
+          </p:cNvPr>
+          <p:cNvSpPr txBox="1"/>
+          <p:nvPr/>
+        </p:nvSpPr>
+        <p:spPr>
+          <a:xfrm>
+            <a:off x="6324600" y="8450231"/>
+            <a:ext cx="17750118" cy="3154710"/>
+          </a:xfrm>
+          <a:prstGeom prst="rect">
+            <a:avLst/>
+          </a:prstGeom>
+          <a:noFill/>
+        </p:spPr>
+        <p:txBody>
+          <a:bodyPr wrap="square" rtlCol="0">
+            <a:spAutoFit/>
+          </a:bodyPr>
+          <a:lstStyle/>
+          <a:p>
+            <a:r>
+              <a:rPr lang="en-US" altLang="ko-KR" sz="19900" b="1" dirty="0">
+                <a:solidFill>
+                  <a:schemeClr val="bg1"/>
+                </a:solidFill>
+              </a:rPr>
+              <a:t>Dev Wiki</a:t>
+            </a:r>
+            <a:endParaRPr lang="ko-KR" altLang="en-US" sz="19900" b="1" dirty="0">
+              <a:solidFill>
+                <a:schemeClr val="bg1"/>
+              </a:solidFill>
+            </a:endParaRPr>
+          </a:p>
+        </p:txBody>
+      </p:sp>
+      <p:pic>
+        <p:nvPicPr>
+          <p:cNvPr id="12" name="Picture 11">
+            <a:extLst>
+              <a:ext uri="{FF2B5EF4-FFF2-40B4-BE49-F238E27FC236}">
+                <a16:creationId xmlns:a16="http://schemas.microsoft.com/office/drawing/2014/main" id="{3D9F4A68-1079-4FDD-AD1B-C901DB881D8A}"/>
+              </a:ext>
+            </a:extLst>
+          </p:cNvPr>
+          <p:cNvPicPr>
+            <a:picLocks noChangeAspect="1"/>
+          </p:cNvPicPr>
+          <p:nvPr/>
+        </p:nvPicPr>
+        <p:blipFill>
+          <a:blip r:embed="rId2">
+            <a:extLst>
+              <a:ext uri="{28A0092B-C50C-407E-A947-70E740481C1C}">
+                <a14:useLocalDpi xmlns:a14="http://schemas.microsoft.com/office/drawing/2010/main" val="0"/>
+              </a:ext>
+            </a:extLst>
+          </a:blip>
+          <a:stretch>
+            <a:fillRect/>
+          </a:stretch>
+        </p:blipFill>
+        <p:spPr>
+          <a:xfrm>
+            <a:off x="1775316" y="1738590"/>
+            <a:ext cx="3316637" cy="3316637"/>
+          </a:xfrm>
+          <a:prstGeom prst="rect">
+            <a:avLst/>
+          </a:prstGeom>
+        </p:spPr>
+      </p:pic>
+      <p:pic>
+        <p:nvPicPr>
+          <p:cNvPr id="14" name="Picture 13">
+            <a:extLst>
+              <a:ext uri="{FF2B5EF4-FFF2-40B4-BE49-F238E27FC236}">
+                <a16:creationId xmlns:a16="http://schemas.microsoft.com/office/drawing/2014/main" id="{F2103119-5F42-4A8E-B991-74DC7A81966D}"/>
+              </a:ext>
+            </a:extLst>
+          </p:cNvPr>
+          <p:cNvPicPr>
+            <a:picLocks noChangeAspect="1"/>
+          </p:cNvPicPr>
+          <p:nvPr/>
+        </p:nvPicPr>
+        <p:blipFill>
+          <a:blip r:embed="rId3">
+            <a:extLst>
+              <a:ext uri="{28A0092B-C50C-407E-A947-70E740481C1C}">
+                <a14:useLocalDpi xmlns:a14="http://schemas.microsoft.com/office/drawing/2010/main" val="0"/>
+              </a:ext>
+            </a:extLst>
+          </a:blip>
+          <a:stretch>
+            <a:fillRect/>
+          </a:stretch>
+        </p:blipFill>
+        <p:spPr>
+          <a:xfrm>
+            <a:off x="1775315" y="8369267"/>
+            <a:ext cx="3316638" cy="3316638"/>
+          </a:xfrm>
+          <a:prstGeom prst="rect">
+            <a:avLst/>
+          </a:prstGeom>
+        </p:spPr>
+      </p:pic>
+    </p:spTree>
+    <p:extLst>
+      <p:ext uri="{BB962C8B-B14F-4D97-AF65-F5344CB8AC3E}">
+        <p14:creationId xmlns:p14="http://schemas.microsoft.com/office/powerpoint/2010/main" val="3327707984"/>
       </p:ext>
     </p:extLst>
   </p:cSld>

</xml_diff>